<commit_message>
Add RIP v1 y OSPF v2
</commit_message>
<xml_diff>
--- a/Scikit-Learn/Scikit-Learn.pptx
+++ b/Scikit-Learn/Scikit-Learn.pptx
@@ -7,12 +7,13 @@
   <p:sldIdLst>
     <p:sldId id="256" r:id="rId2"/>
     <p:sldId id="257" r:id="rId3"/>
-    <p:sldId id="258" r:id="rId4"/>
-    <p:sldId id="259" r:id="rId5"/>
-    <p:sldId id="260" r:id="rId6"/>
-    <p:sldId id="261" r:id="rId7"/>
-    <p:sldId id="262" r:id="rId8"/>
-    <p:sldId id="263" r:id="rId9"/>
+    <p:sldId id="264" r:id="rId4"/>
+    <p:sldId id="258" r:id="rId5"/>
+    <p:sldId id="259" r:id="rId6"/>
+    <p:sldId id="260" r:id="rId7"/>
+    <p:sldId id="261" r:id="rId8"/>
+    <p:sldId id="262" r:id="rId9"/>
+    <p:sldId id="263" r:id="rId10"/>
   </p:sldIdLst>
   <p:sldSz cx="12192000" cy="6858000"/>
   <p:notesSz cx="6858000" cy="9144000"/>
@@ -2965,7 +2966,7 @@
           </a:lstStyle>
           <a:p>
             <a:r>
-              <a:rPr lang="es-ES"/>
+              <a:rPr lang="es-ES" dirty="0"/>
               <a:t>Haga clic en el icono para agregar una imagen</a:t>
             </a:r>
             <a:endParaRPr lang="en-US" dirty="0"/>
@@ -4144,6 +4145,171 @@
           <p:cNvPr id="2" name="Título 1">
             <a:extLst>
               <a:ext uri="{FF2B5EF4-FFF2-40B4-BE49-F238E27FC236}">
+                <a16:creationId xmlns:a16="http://schemas.microsoft.com/office/drawing/2014/main" id="{BF155257-7157-0EAA-D520-AF44C6DE9619}"/>
+              </a:ext>
+            </a:extLst>
+          </p:cNvPr>
+          <p:cNvSpPr>
+            <a:spLocks noGrp="1"/>
+          </p:cNvSpPr>
+          <p:nvPr>
+            <p:ph type="title"/>
+          </p:nvPr>
+        </p:nvSpPr>
+        <p:spPr/>
+        <p:txBody>
+          <a:bodyPr/>
+          <a:lstStyle/>
+          <a:p>
+            <a:r>
+              <a:rPr lang="es-CO" dirty="0"/>
+              <a:t>COMANDOS PRINCIPALES</a:t>
+            </a:r>
+          </a:p>
+        </p:txBody>
+      </p:sp>
+      <p:sp>
+        <p:nvSpPr>
+          <p:cNvPr id="3" name="Marcador de contenido 2">
+            <a:extLst>
+              <a:ext uri="{FF2B5EF4-FFF2-40B4-BE49-F238E27FC236}">
+                <a16:creationId xmlns:a16="http://schemas.microsoft.com/office/drawing/2014/main" id="{57FEE26E-0B76-82D0-BA0F-42C7F2BBBA11}"/>
+              </a:ext>
+            </a:extLst>
+          </p:cNvPr>
+          <p:cNvSpPr>
+            <a:spLocks noGrp="1"/>
+          </p:cNvSpPr>
+          <p:nvPr>
+            <p:ph idx="1"/>
+          </p:nvPr>
+        </p:nvSpPr>
+        <p:spPr>
+          <a:xfrm>
+            <a:off x="581192" y="2054087"/>
+            <a:ext cx="11029615" cy="4465983"/>
+          </a:xfrm>
+        </p:spPr>
+        <p:txBody>
+          <a:bodyPr>
+            <a:normAutofit/>
+          </a:bodyPr>
+          <a:lstStyle/>
+          <a:p>
+            <a:r>
+              <a:rPr lang="es-CO" dirty="0"/>
+              <a:t>Importar biblioteca:</a:t>
+            </a:r>
+            <a:br>
+              <a:rPr lang="es-CO" dirty="0"/>
+            </a:br>
+            <a:r>
+              <a:rPr lang="es-CO" dirty="0"/>
+              <a:t>from sklearn import [modulo]</a:t>
+            </a:r>
+          </a:p>
+          <a:p>
+            <a:r>
+              <a:rPr lang="es-CO" dirty="0"/>
+              <a:t>División del conjunto de datos para entrenamiento y pruebas:</a:t>
+            </a:r>
+            <a:br>
+              <a:rPr lang="es-CO" dirty="0"/>
+            </a:br>
+            <a:r>
+              <a:rPr lang="es-CO" dirty="0"/>
+              <a:t>X_train, X_test, y_train, y_test = train_test_split(X, y, test_size = 0.25, random_state = 0)</a:t>
+            </a:r>
+          </a:p>
+          <a:p>
+            <a:r>
+              <a:rPr lang="es-CO" dirty="0"/>
+              <a:t>Entrenar modelo:</a:t>
+            </a:r>
+            <a:br>
+              <a:rPr lang="es-CO" dirty="0"/>
+            </a:br>
+            <a:r>
+              <a:rPr lang="es-CO" dirty="0"/>
+              <a:t>[modelo].fit(X_train, y_train)</a:t>
+            </a:r>
+          </a:p>
+          <a:p>
+            <a:r>
+              <a:rPr lang="es-CO" dirty="0"/>
+              <a:t>Predicción del modelo:</a:t>
+            </a:r>
+            <a:br>
+              <a:rPr lang="es-CO" dirty="0"/>
+            </a:br>
+            <a:r>
+              <a:rPr lang="es-CO" dirty="0"/>
+              <a:t>Y_pred = [modelo].predict(X_test)</a:t>
+            </a:r>
+          </a:p>
+          <a:p>
+            <a:r>
+              <a:rPr lang="es-CO" dirty="0"/>
+              <a:t>Matriz de confusión:</a:t>
+            </a:r>
+            <a:br>
+              <a:rPr lang="es-CO" dirty="0"/>
+            </a:br>
+            <a:r>
+              <a:rPr lang="es-CO" dirty="0"/>
+              <a:t>metrics.confusion_matrix(y_test, y_pred)</a:t>
+            </a:r>
+          </a:p>
+          <a:p>
+            <a:r>
+              <a:rPr lang="es-CO" dirty="0"/>
+              <a:t>Calcular la exactitud:</a:t>
+            </a:r>
+            <a:br>
+              <a:rPr lang="es-CO" dirty="0"/>
+            </a:br>
+            <a:r>
+              <a:rPr lang="es-CO" dirty="0"/>
+              <a:t>metrics.accuracy_score(y_test, y_pred)</a:t>
+            </a:r>
+          </a:p>
+        </p:txBody>
+      </p:sp>
+    </p:spTree>
+    <p:extLst>
+      <p:ext uri="{BB962C8B-B14F-4D97-AF65-F5344CB8AC3E}">
+        <p14:creationId xmlns:p14="http://schemas.microsoft.com/office/powerpoint/2010/main" val="853272325"/>
+      </p:ext>
+    </p:extLst>
+  </p:cSld>
+  <p:clrMapOvr>
+    <a:masterClrMapping/>
+  </p:clrMapOvr>
+</p:sld>
+</file>
+
+<file path=ppt/slides/slide4.xml><?xml version="1.0" encoding="utf-8"?>
+<p:sld xmlns:a="http://schemas.openxmlformats.org/drawingml/2006/main" xmlns:r="http://schemas.openxmlformats.org/officeDocument/2006/relationships" xmlns:p="http://schemas.openxmlformats.org/presentationml/2006/main">
+  <p:cSld>
+    <p:spTree>
+      <p:nvGrpSpPr>
+        <p:cNvPr id="1" name=""/>
+        <p:cNvGrpSpPr/>
+        <p:nvPr/>
+      </p:nvGrpSpPr>
+      <p:grpSpPr>
+        <a:xfrm>
+          <a:off x="0" y="0"/>
+          <a:ext cx="0" cy="0"/>
+          <a:chOff x="0" y="0"/>
+          <a:chExt cx="0" cy="0"/>
+        </a:xfrm>
+      </p:grpSpPr>
+      <p:sp>
+        <p:nvSpPr>
+          <p:cNvPr id="2" name="Título 1">
+            <a:extLst>
+              <a:ext uri="{FF2B5EF4-FFF2-40B4-BE49-F238E27FC236}">
                 <a16:creationId xmlns:a16="http://schemas.microsoft.com/office/drawing/2014/main" id="{508B75C4-D114-E141-CDDD-0F18827DE082}"/>
               </a:ext>
             </a:extLst>
@@ -4285,7 +4451,7 @@
 </p:sld>
 </file>
 
-<file path=ppt/slides/slide4.xml><?xml version="1.0" encoding="utf-8"?>
+<file path=ppt/slides/slide5.xml><?xml version="1.0" encoding="utf-8"?>
 <p:sld xmlns:a="http://schemas.openxmlformats.org/drawingml/2006/main" xmlns:r="http://schemas.openxmlformats.org/officeDocument/2006/relationships" xmlns:p="http://schemas.openxmlformats.org/presentationml/2006/main">
   <p:cSld>
     <p:spTree>
@@ -4375,7 +4541,7 @@
 </p:sld>
 </file>
 
-<file path=ppt/slides/slide5.xml><?xml version="1.0" encoding="utf-8"?>
+<file path=ppt/slides/slide6.xml><?xml version="1.0" encoding="utf-8"?>
 <p:sld xmlns:a="http://schemas.openxmlformats.org/drawingml/2006/main" xmlns:r="http://schemas.openxmlformats.org/officeDocument/2006/relationships" xmlns:p="http://schemas.openxmlformats.org/presentationml/2006/main">
   <p:cSld>
     <p:spTree>
@@ -4586,96 +4752,6 @@
 </p:sld>
 </file>
 
-<file path=ppt/slides/slide6.xml><?xml version="1.0" encoding="utf-8"?>
-<p:sld xmlns:a="http://schemas.openxmlformats.org/drawingml/2006/main" xmlns:r="http://schemas.openxmlformats.org/officeDocument/2006/relationships" xmlns:p="http://schemas.openxmlformats.org/presentationml/2006/main">
-  <p:cSld>
-    <p:spTree>
-      <p:nvGrpSpPr>
-        <p:cNvPr id="1" name=""/>
-        <p:cNvGrpSpPr/>
-        <p:nvPr/>
-      </p:nvGrpSpPr>
-      <p:grpSpPr>
-        <a:xfrm>
-          <a:off x="0" y="0"/>
-          <a:ext cx="0" cy="0"/>
-          <a:chOff x="0" y="0"/>
-          <a:chExt cx="0" cy="0"/>
-        </a:xfrm>
-      </p:grpSpPr>
-      <p:sp>
-        <p:nvSpPr>
-          <p:cNvPr id="2" name="Título 1">
-            <a:extLst>
-              <a:ext uri="{FF2B5EF4-FFF2-40B4-BE49-F238E27FC236}">
-                <a16:creationId xmlns:a16="http://schemas.microsoft.com/office/drawing/2014/main" id="{7825339C-0847-DDEB-3CAC-F47F6E9C3489}"/>
-              </a:ext>
-            </a:extLst>
-          </p:cNvPr>
-          <p:cNvSpPr>
-            <a:spLocks noGrp="1"/>
-          </p:cNvSpPr>
-          <p:nvPr>
-            <p:ph type="title"/>
-          </p:nvPr>
-        </p:nvSpPr>
-        <p:spPr/>
-        <p:txBody>
-          <a:bodyPr/>
-          <a:lstStyle/>
-          <a:p>
-            <a:r>
-              <a:rPr lang="es-CO" dirty="0"/>
-              <a:t>dependencias</a:t>
-            </a:r>
-          </a:p>
-        </p:txBody>
-      </p:sp>
-      <p:pic>
-        <p:nvPicPr>
-          <p:cNvPr id="4" name="Marcador de contenido 3">
-            <a:extLst>
-              <a:ext uri="{FF2B5EF4-FFF2-40B4-BE49-F238E27FC236}">
-                <a16:creationId xmlns:a16="http://schemas.microsoft.com/office/drawing/2014/main" id="{15374C5C-5972-252C-2EDD-72AFC16F8E32}"/>
-              </a:ext>
-            </a:extLst>
-          </p:cNvPr>
-          <p:cNvPicPr>
-            <a:picLocks noGrp="1" noChangeAspect="1"/>
-          </p:cNvPicPr>
-          <p:nvPr>
-            <p:ph idx="1"/>
-          </p:nvPr>
-        </p:nvPicPr>
-        <p:blipFill>
-          <a:blip r:embed="rId2"/>
-          <a:stretch>
-            <a:fillRect/>
-          </a:stretch>
-        </p:blipFill>
-        <p:spPr>
-          <a:xfrm>
-            <a:off x="3071865" y="1895062"/>
-            <a:ext cx="6048270" cy="4844585"/>
-          </a:xfrm>
-          <a:prstGeom prst="rect">
-            <a:avLst/>
-          </a:prstGeom>
-        </p:spPr>
-      </p:pic>
-    </p:spTree>
-    <p:extLst>
-      <p:ext uri="{BB962C8B-B14F-4D97-AF65-F5344CB8AC3E}">
-        <p14:creationId xmlns:p14="http://schemas.microsoft.com/office/powerpoint/2010/main" val="2662758622"/>
-      </p:ext>
-    </p:extLst>
-  </p:cSld>
-  <p:clrMapOvr>
-    <a:masterClrMapping/>
-  </p:clrMapOvr>
-</p:sld>
-</file>
-
 <file path=ppt/slides/slide7.xml><?xml version="1.0" encoding="utf-8"?>
 <p:sld xmlns:a="http://schemas.openxmlformats.org/drawingml/2006/main" xmlns:r="http://schemas.openxmlformats.org/officeDocument/2006/relationships" xmlns:p="http://schemas.openxmlformats.org/presentationml/2006/main">
   <p:cSld>
@@ -4698,6 +4774,96 @@
           <p:cNvPr id="2" name="Título 1">
             <a:extLst>
               <a:ext uri="{FF2B5EF4-FFF2-40B4-BE49-F238E27FC236}">
+                <a16:creationId xmlns:a16="http://schemas.microsoft.com/office/drawing/2014/main" id="{7825339C-0847-DDEB-3CAC-F47F6E9C3489}"/>
+              </a:ext>
+            </a:extLst>
+          </p:cNvPr>
+          <p:cNvSpPr>
+            <a:spLocks noGrp="1"/>
+          </p:cNvSpPr>
+          <p:nvPr>
+            <p:ph type="title"/>
+          </p:nvPr>
+        </p:nvSpPr>
+        <p:spPr/>
+        <p:txBody>
+          <a:bodyPr/>
+          <a:lstStyle/>
+          <a:p>
+            <a:r>
+              <a:rPr lang="es-CO" dirty="0"/>
+              <a:t>dependencias</a:t>
+            </a:r>
+          </a:p>
+        </p:txBody>
+      </p:sp>
+      <p:pic>
+        <p:nvPicPr>
+          <p:cNvPr id="4" name="Marcador de contenido 3">
+            <a:extLst>
+              <a:ext uri="{FF2B5EF4-FFF2-40B4-BE49-F238E27FC236}">
+                <a16:creationId xmlns:a16="http://schemas.microsoft.com/office/drawing/2014/main" id="{15374C5C-5972-252C-2EDD-72AFC16F8E32}"/>
+              </a:ext>
+            </a:extLst>
+          </p:cNvPr>
+          <p:cNvPicPr>
+            <a:picLocks noGrp="1" noChangeAspect="1"/>
+          </p:cNvPicPr>
+          <p:nvPr>
+            <p:ph idx="1"/>
+          </p:nvPr>
+        </p:nvPicPr>
+        <p:blipFill>
+          <a:blip r:embed="rId2"/>
+          <a:stretch>
+            <a:fillRect/>
+          </a:stretch>
+        </p:blipFill>
+        <p:spPr>
+          <a:xfrm>
+            <a:off x="3071865" y="1895062"/>
+            <a:ext cx="6048270" cy="4844585"/>
+          </a:xfrm>
+          <a:prstGeom prst="rect">
+            <a:avLst/>
+          </a:prstGeom>
+        </p:spPr>
+      </p:pic>
+    </p:spTree>
+    <p:extLst>
+      <p:ext uri="{BB962C8B-B14F-4D97-AF65-F5344CB8AC3E}">
+        <p14:creationId xmlns:p14="http://schemas.microsoft.com/office/powerpoint/2010/main" val="2662758622"/>
+      </p:ext>
+    </p:extLst>
+  </p:cSld>
+  <p:clrMapOvr>
+    <a:masterClrMapping/>
+  </p:clrMapOvr>
+</p:sld>
+</file>
+
+<file path=ppt/slides/slide8.xml><?xml version="1.0" encoding="utf-8"?>
+<p:sld xmlns:a="http://schemas.openxmlformats.org/drawingml/2006/main" xmlns:r="http://schemas.openxmlformats.org/officeDocument/2006/relationships" xmlns:p="http://schemas.openxmlformats.org/presentationml/2006/main">
+  <p:cSld>
+    <p:spTree>
+      <p:nvGrpSpPr>
+        <p:cNvPr id="1" name=""/>
+        <p:cNvGrpSpPr/>
+        <p:nvPr/>
+      </p:nvGrpSpPr>
+      <p:grpSpPr>
+        <a:xfrm>
+          <a:off x="0" y="0"/>
+          <a:ext cx="0" cy="0"/>
+          <a:chOff x="0" y="0"/>
+          <a:chExt cx="0" cy="0"/>
+        </a:xfrm>
+      </p:grpSpPr>
+      <p:sp>
+        <p:nvSpPr>
+          <p:cNvPr id="2" name="Título 1">
+            <a:extLst>
+              <a:ext uri="{FF2B5EF4-FFF2-40B4-BE49-F238E27FC236}">
                 <a16:creationId xmlns:a16="http://schemas.microsoft.com/office/drawing/2014/main" id="{977FAF56-F47E-39B3-8018-700A542ECBEB}"/>
               </a:ext>
             </a:extLst>
@@ -4818,7 +4984,7 @@
 </p:sld>
 </file>
 
-<file path=ppt/slides/slide8.xml><?xml version="1.0" encoding="utf-8"?>
+<file path=ppt/slides/slide9.xml><?xml version="1.0" encoding="utf-8"?>
 <p:sld xmlns:a="http://schemas.openxmlformats.org/drawingml/2006/main" xmlns:r="http://schemas.openxmlformats.org/officeDocument/2006/relationships" xmlns:p="http://schemas.openxmlformats.org/presentationml/2006/main">
   <p:cSld>
     <p:spTree>

</xml_diff>